<commit_message>
no name should be a prefix of another
</commit_message>
<xml_diff>
--- a/plclub-2021.pptx
+++ b/plclub-2021.pptx
@@ -25362,7 +25362,12 @@
             <p:ph type="title"/>
           </p:nvPr>
         </p:nvSpPr>
-        <p:spPr/>
+        <p:spPr>
+          <a:xfrm>
+            <a:off x="571501" y="0"/>
+            <a:ext cx="7886700" cy="994172"/>
+          </a:xfrm>
+        </p:spPr>
         <p:txBody>
           <a:bodyPr/>
           <a:lstStyle/>
@@ -25396,7 +25401,7 @@
         </p:nvSpPr>
         <p:spPr>
           <a:xfrm>
-            <a:off x="628651" y="1154563"/>
+            <a:off x="571501" y="1111827"/>
             <a:ext cx="3886200" cy="3263504"/>
           </a:xfrm>
         </p:spPr>
@@ -25487,7 +25492,12 @@
             <p:ph sz="half" idx="2"/>
           </p:nvPr>
         </p:nvSpPr>
-        <p:spPr/>
+        <p:spPr>
+          <a:xfrm>
+            <a:off x="4572001" y="1111827"/>
+            <a:ext cx="3886200" cy="3263504"/>
+          </a:xfrm>
+        </p:spPr>
         <p:txBody>
           <a:bodyPr/>
           <a:lstStyle/>
@@ -25497,7 +25507,7 @@
             </a:pPr>
             <a:r>
               <a:rPr lang="en-US" dirty="0"/>
-              <a:t>These binding implementations involve</a:t>
+              <a:t>These implementations differ in</a:t>
             </a:r>
           </a:p>
           <a:p>
@@ -25608,8 +25618,13 @@
           <a:p>
             <a:r>
               <a:rPr lang="en-US" dirty="0"/>
-              <a:t>Quick implementation of key operations, with confidence</a:t>
-            </a:r>
+              <a:t>Quick implementation of key operations, </a:t>
+            </a:r>
+            <a:r>
+              <a:rPr lang="en-US"/>
+              <a:t>with high confidence</a:t>
+            </a:r>
+            <a:endParaRPr lang="en-US" dirty="0"/>
           </a:p>
           <a:p>
             <a:pPr lvl="1"/>

</xml_diff>

<commit_message>
clean up locally nameless
</commit_message>
<xml_diff>
--- a/plclub-2021.pptx
+++ b/plclub-2021.pptx
@@ -5,17 +5,17 @@
     <p:sldMasterId id="2147483737" r:id="rId1"/>
   </p:sldMasterIdLst>
   <p:notesMasterIdLst>
-    <p:notesMasterId r:id="rId39"/>
+    <p:notesMasterId r:id="rId40"/>
   </p:notesMasterIdLst>
   <p:sldIdLst>
     <p:sldId id="256" r:id="rId2"/>
     <p:sldId id="310" r:id="rId3"/>
     <p:sldId id="362" r:id="rId4"/>
-    <p:sldId id="370" r:id="rId5"/>
-    <p:sldId id="363" r:id="rId6"/>
-    <p:sldId id="364" r:id="rId7"/>
+    <p:sldId id="363" r:id="rId5"/>
+    <p:sldId id="364" r:id="rId6"/>
+    <p:sldId id="370" r:id="rId7"/>
     <p:sldId id="365" r:id="rId8"/>
-    <p:sldId id="361" r:id="rId9"/>
+    <p:sldId id="380" r:id="rId9"/>
     <p:sldId id="291" r:id="rId10"/>
     <p:sldId id="360" r:id="rId11"/>
     <p:sldId id="294" r:id="rId12"/>
@@ -31,20 +31,21 @@
     <p:sldId id="371" r:id="rId22"/>
     <p:sldId id="369" r:id="rId23"/>
     <p:sldId id="368" r:id="rId24"/>
-    <p:sldId id="378" r:id="rId25"/>
-    <p:sldId id="295" r:id="rId26"/>
-    <p:sldId id="330" r:id="rId27"/>
-    <p:sldId id="350" r:id="rId28"/>
-    <p:sldId id="351" r:id="rId29"/>
-    <p:sldId id="352" r:id="rId30"/>
-    <p:sldId id="316" r:id="rId31"/>
-    <p:sldId id="326" r:id="rId32"/>
-    <p:sldId id="332" r:id="rId33"/>
-    <p:sldId id="331" r:id="rId34"/>
-    <p:sldId id="353" r:id="rId35"/>
-    <p:sldId id="345" r:id="rId36"/>
-    <p:sldId id="346" r:id="rId37"/>
-    <p:sldId id="359" r:id="rId38"/>
+    <p:sldId id="361" r:id="rId25"/>
+    <p:sldId id="378" r:id="rId26"/>
+    <p:sldId id="295" r:id="rId27"/>
+    <p:sldId id="330" r:id="rId28"/>
+    <p:sldId id="350" r:id="rId29"/>
+    <p:sldId id="351" r:id="rId30"/>
+    <p:sldId id="352" r:id="rId31"/>
+    <p:sldId id="316" r:id="rId32"/>
+    <p:sldId id="326" r:id="rId33"/>
+    <p:sldId id="332" r:id="rId34"/>
+    <p:sldId id="331" r:id="rId35"/>
+    <p:sldId id="353" r:id="rId36"/>
+    <p:sldId id="345" r:id="rId37"/>
+    <p:sldId id="346" r:id="rId38"/>
+    <p:sldId id="359" r:id="rId39"/>
   </p:sldIdLst>
   <p:sldSz cx="9144000" cy="5143500" type="screen16x9"/>
   <p:notesSz cx="6858000" cy="9144000"/>
@@ -244,7 +245,7 @@
           <a:p>
             <a:fld id="{F4FDCA05-7818-8249-9B7A-72DA32C1DFB1}" type="datetimeFigureOut">
               <a:rPr lang="en-US" smtClean="0"/>
-              <a:t>7/28/21</a:t>
+              <a:t>7/30/21</a:t>
             </a:fld>
             <a:endParaRPr lang="en-US"/>
           </a:p>
@@ -1083,7 +1084,7 @@
           <a:p>
             <a:fld id="{A180D43F-ACE1-D140-AD95-9AB5F0193656}" type="slidenum">
               <a:rPr lang="en-US" smtClean="0"/>
-              <a:t>26</a:t>
+              <a:t>27</a:t>
             </a:fld>
             <a:endParaRPr lang="en-US"/>
           </a:p>
@@ -1175,7 +1176,7 @@
           <a:p>
             <a:fld id="{A180D43F-ACE1-D140-AD95-9AB5F0193656}" type="slidenum">
               <a:rPr lang="en-US" smtClean="0"/>
-              <a:t>27</a:t>
+              <a:t>28</a:t>
             </a:fld>
             <a:endParaRPr lang="en-US"/>
           </a:p>
@@ -1262,7 +1263,7 @@
           <a:p>
             <a:fld id="{A180D43F-ACE1-D140-AD95-9AB5F0193656}" type="slidenum">
               <a:rPr lang="en-US" smtClean="0"/>
-              <a:t>29</a:t>
+              <a:t>30</a:t>
             </a:fld>
             <a:endParaRPr lang="en-US"/>
           </a:p>
@@ -1536,7 +1537,7 @@
           <a:p>
             <a:fld id="{A180D43F-ACE1-D140-AD95-9AB5F0193656}" type="slidenum">
               <a:rPr lang="en-US" smtClean="0"/>
-              <a:t>30</a:t>
+              <a:t>31</a:t>
             </a:fld>
             <a:endParaRPr lang="en-US"/>
           </a:p>
@@ -1620,7 +1621,7 @@
           <a:p>
             <a:fld id="{A180D43F-ACE1-D140-AD95-9AB5F0193656}" type="slidenum">
               <a:rPr lang="en-US" smtClean="0"/>
-              <a:t>31</a:t>
+              <a:t>32</a:t>
             </a:fld>
             <a:endParaRPr lang="en-US"/>
           </a:p>
@@ -1791,7 +1792,7 @@
           <a:p>
             <a:fld id="{A180D43F-ACE1-D140-AD95-9AB5F0193656}" type="slidenum">
               <a:rPr lang="en-US" smtClean="0"/>
-              <a:t>32</a:t>
+              <a:t>33</a:t>
             </a:fld>
             <a:endParaRPr lang="en-US"/>
           </a:p>
@@ -1883,7 +1884,7 @@
           <a:p>
             <a:fld id="{A180D43F-ACE1-D140-AD95-9AB5F0193656}" type="slidenum">
               <a:rPr lang="en-US" smtClean="0"/>
-              <a:t>34</a:t>
+              <a:t>35</a:t>
             </a:fld>
             <a:endParaRPr lang="en-US"/>
           </a:p>
@@ -1967,7 +1968,7 @@
           <a:p>
             <a:fld id="{A180D43F-ACE1-D140-AD95-9AB5F0193656}" type="slidenum">
               <a:rPr lang="en-US" smtClean="0"/>
-              <a:t>35</a:t>
+              <a:t>36</a:t>
             </a:fld>
             <a:endParaRPr lang="en-US"/>
           </a:p>
@@ -2051,7 +2052,7 @@
           <a:p>
             <a:fld id="{A180D43F-ACE1-D140-AD95-9AB5F0193656}" type="slidenum">
               <a:rPr lang="en-US" smtClean="0"/>
-              <a:t>36</a:t>
+              <a:t>37</a:t>
             </a:fld>
             <a:endParaRPr lang="en-US"/>
           </a:p>
@@ -2135,7 +2136,7 @@
           <a:p>
             <a:fld id="{A180D43F-ACE1-D140-AD95-9AB5F0193656}" type="slidenum">
               <a:rPr lang="en-US" smtClean="0"/>
-              <a:t>5</a:t>
+              <a:t>4</a:t>
             </a:fld>
             <a:endParaRPr lang="en-US"/>
           </a:p>
@@ -2219,7 +2220,7 @@
           <a:p>
             <a:fld id="{A180D43F-ACE1-D140-AD95-9AB5F0193656}" type="slidenum">
               <a:rPr lang="en-US" smtClean="0"/>
-              <a:t>6</a:t>
+              <a:t>5</a:t>
             </a:fld>
             <a:endParaRPr lang="en-US"/>
           </a:p>
@@ -2816,7 +2817,7 @@
           <a:p>
             <a:fld id="{4AAD347D-5ACD-4C99-B74B-A9C85AD731AF}" type="datetimeFigureOut">
               <a:rPr lang="en-US" smtClean="0"/>
-              <a:t>7/28/21</a:t>
+              <a:t>7/30/21</a:t>
             </a:fld>
             <a:endParaRPr lang="en-US" dirty="0"/>
           </a:p>
@@ -2986,7 +2987,7 @@
           <a:p>
             <a:fld id="{4509A250-FF31-4206-8172-F9D3106AACB1}" type="datetimeFigureOut">
               <a:rPr lang="en-US" smtClean="0"/>
-              <a:t>7/28/21</a:t>
+              <a:t>7/30/21</a:t>
             </a:fld>
             <a:endParaRPr lang="en-US" dirty="0"/>
           </a:p>
@@ -3166,7 +3167,7 @@
           <a:p>
             <a:fld id="{4509A250-FF31-4206-8172-F9D3106AACB1}" type="datetimeFigureOut">
               <a:rPr lang="en-US" smtClean="0"/>
-              <a:t>7/28/21</a:t>
+              <a:t>7/30/21</a:t>
             </a:fld>
             <a:endParaRPr lang="en-US" dirty="0"/>
           </a:p>
@@ -3355,7 +3356,7 @@
           <a:p>
             <a:fld id="{4509A250-FF31-4206-8172-F9D3106AACB1}" type="datetimeFigureOut">
               <a:rPr lang="en-US" smtClean="0"/>
-              <a:t>7/28/21</a:t>
+              <a:t>7/30/21</a:t>
             </a:fld>
             <a:endParaRPr lang="en-US" dirty="0"/>
           </a:p>
@@ -3600,7 +3601,7 @@
           <a:p>
             <a:fld id="{9796027F-7875-4030-9381-8BD8C4F21935}" type="datetimeFigureOut">
               <a:rPr lang="en-US" smtClean="0"/>
-              <a:t>7/28/21</a:t>
+              <a:t>7/30/21</a:t>
             </a:fld>
             <a:endParaRPr lang="en-US" dirty="0"/>
           </a:p>
@@ -3832,7 +3833,7 @@
           <a:p>
             <a:fld id="{9796027F-7875-4030-9381-8BD8C4F21935}" type="datetimeFigureOut">
               <a:rPr lang="en-US" smtClean="0"/>
-              <a:t>7/28/21</a:t>
+              <a:t>7/30/21</a:t>
             </a:fld>
             <a:endParaRPr lang="en-US" dirty="0"/>
           </a:p>
@@ -4199,7 +4200,7 @@
           <a:p>
             <a:fld id="{9796027F-7875-4030-9381-8BD8C4F21935}" type="datetimeFigureOut">
               <a:rPr lang="en-US" smtClean="0"/>
-              <a:t>7/28/21</a:t>
+              <a:t>7/30/21</a:t>
             </a:fld>
             <a:endParaRPr lang="en-US" dirty="0"/>
           </a:p>
@@ -4317,7 +4318,7 @@
           <a:p>
             <a:fld id="{4509A250-FF31-4206-8172-F9D3106AACB1}" type="datetimeFigureOut">
               <a:rPr lang="en-US" smtClean="0"/>
-              <a:t>7/28/21</a:t>
+              <a:t>7/30/21</a:t>
             </a:fld>
             <a:endParaRPr lang="en-US" dirty="0"/>
           </a:p>
@@ -4412,7 +4413,7 @@
           <a:p>
             <a:fld id="{4509A250-FF31-4206-8172-F9D3106AACB1}" type="datetimeFigureOut">
               <a:rPr lang="en-US" smtClean="0"/>
-              <a:t>7/28/21</a:t>
+              <a:t>7/30/21</a:t>
             </a:fld>
             <a:endParaRPr lang="en-US" dirty="0"/>
           </a:p>
@@ -4689,7 +4690,7 @@
           <a:p>
             <a:fld id="{4509A250-FF31-4206-8172-F9D3106AACB1}" type="datetimeFigureOut">
               <a:rPr lang="en-US" smtClean="0"/>
-              <a:t>7/28/21</a:t>
+              <a:t>7/30/21</a:t>
             </a:fld>
             <a:endParaRPr lang="en-US" dirty="0"/>
           </a:p>
@@ -4946,7 +4947,7 @@
           <a:p>
             <a:fld id="{4509A250-FF31-4206-8172-F9D3106AACB1}" type="datetimeFigureOut">
               <a:rPr lang="en-US" smtClean="0"/>
-              <a:t>7/28/21</a:t>
+              <a:t>7/30/21</a:t>
             </a:fld>
             <a:endParaRPr lang="en-US" dirty="0"/>
           </a:p>
@@ -5159,7 +5160,7 @@
           <a:p>
             <a:fld id="{4AAD347D-5ACD-4C99-B74B-A9C85AD731AF}" type="datetimeFigureOut">
               <a:rPr lang="en-US" smtClean="0"/>
-              <a:t>7/28/21</a:t>
+              <a:t>7/30/21</a:t>
             </a:fld>
             <a:endParaRPr lang="en-US" dirty="0"/>
           </a:p>
@@ -7867,42 +7868,6 @@
           </a:p>
         </p:txBody>
       </p:sp>
-      <p:sp>
-        <p:nvSpPr>
-          <p:cNvPr id="4" name="TextBox 3">
-            <a:extLst>
-              <a:ext uri="{FF2B5EF4-FFF2-40B4-BE49-F238E27FC236}">
-                <a16:creationId xmlns:a16="http://schemas.microsoft.com/office/drawing/2014/main" id="{B52175FF-6858-7943-9792-43905E39BB21}"/>
-              </a:ext>
-            </a:extLst>
-          </p:cNvPr>
-          <p:cNvSpPr txBox="1"/>
-          <p:nvPr/>
-        </p:nvSpPr>
-        <p:spPr>
-          <a:xfrm>
-            <a:off x="0" y="4866501"/>
-            <a:ext cx="694421" cy="248209"/>
-          </a:xfrm>
-          <a:prstGeom prst="rect">
-            <a:avLst/>
-          </a:prstGeom>
-          <a:noFill/>
-        </p:spPr>
-        <p:txBody>
-          <a:bodyPr wrap="none" rtlCol="0">
-            <a:spAutoFit/>
-          </a:bodyPr>
-          <a:lstStyle/>
-          <a:p>
-            <a:r>
-              <a:rPr lang="en-US" sz="1013" dirty="0" err="1"/>
-              <a:t>Simple.hs</a:t>
-            </a:r>
-            <a:endParaRPr lang="en-US" sz="1013" dirty="0"/>
-          </a:p>
-        </p:txBody>
-      </p:sp>
       <p:cxnSp>
         <p:nvCxnSpPr>
           <p:cNvPr id="7" name="Straight Connector 6">
@@ -10040,7 +10005,7 @@
           <a:p>
             <a:r>
               <a:rPr lang="en-US" dirty="0" err="1"/>
-              <a:t>L.hs</a:t>
+              <a:t>Par.L.hs</a:t>
             </a:r>
             <a:r>
               <a:rPr lang="en-US" dirty="0"/>
@@ -10050,7 +10015,7 @@
           <a:p>
             <a:r>
               <a:rPr lang="en-US" dirty="0" err="1"/>
-              <a:t>F.hs</a:t>
+              <a:t>Par.Fun.hs</a:t>
             </a:r>
             <a:r>
               <a:rPr lang="en-US" dirty="0"/>
@@ -10060,7 +10025,7 @@
           <a:p>
             <a:r>
               <a:rPr lang="en-US" dirty="0" err="1"/>
-              <a:t>P.hs</a:t>
+              <a:t>Par.P.hs</a:t>
             </a:r>
             <a:r>
               <a:rPr lang="en-US" dirty="0"/>
@@ -10070,7 +10035,7 @@
           <a:p>
             <a:r>
               <a:rPr lang="en-US" dirty="0" err="1"/>
-              <a:t>B.hs</a:t>
+              <a:t>Par.B.hs</a:t>
             </a:r>
             <a:r>
               <a:rPr lang="en-US" dirty="0"/>
@@ -10397,20 +10362,17 @@
             </a:r>
             <a:r>
               <a:rPr lang="en-US" dirty="0" err="1"/>
-              <a:t>GHC.Generics</a:t>
+              <a:t>TemplateHaskell</a:t>
             </a:r>
             <a:r>
               <a:rPr lang="en-US" dirty="0"/>
-              <a:t> or </a:t>
-            </a:r>
-            <a:r>
-              <a:rPr lang="en-US" dirty="0" err="1"/>
-              <a:t>TemplateHaskell</a:t>
-            </a:r>
-            <a:r>
-              <a:rPr lang="en-US" dirty="0"/>
-              <a:t> to derive the appropriate mapping operation (similar to unbound library)</a:t>
-            </a:r>
+              <a:t> to derive the appropriate </a:t>
+            </a:r>
+            <a:r>
+              <a:rPr lang="en-US"/>
+              <a:t>mapping operation</a:t>
+            </a:r>
+            <a:endParaRPr lang="en-US" dirty="0"/>
           </a:p>
         </p:txBody>
       </p:sp>
@@ -10489,7 +10451,7 @@
           <p:nvPr>
             <p:extLst>
               <p:ext uri="{D42A27DB-BD31-4B8C-83A1-F6EECF244321}">
-                <p14:modId xmlns:p14="http://schemas.microsoft.com/office/powerpoint/2010/main" val="4208171352"/>
+                <p14:modId xmlns:p14="http://schemas.microsoft.com/office/powerpoint/2010/main" val="596147727"/>
               </p:ext>
             </p:extLst>
           </p:nvPr>
@@ -10637,7 +10599,7 @@
                     <a:p>
                       <a:r>
                         <a:rPr lang="en-US" sz="2400" dirty="0"/>
-                        <a:t>L, F, P, B</a:t>
+                        <a:t>L, Fun, P, B</a:t>
                       </a:r>
                     </a:p>
                   </a:txBody>
@@ -10650,7 +10612,7 @@
                     <a:p>
                       <a:r>
                         <a:rPr lang="en-US" sz="2400" dirty="0"/>
-                        <a:t>Kit (like F), Scoped (like B)</a:t>
+                        <a:t>Kit, Scoped</a:t>
                       </a:r>
                     </a:p>
                   </a:txBody>
@@ -12530,6 +12492,179 @@
       </p:grpSpPr>
       <p:sp>
         <p:nvSpPr>
+          <p:cNvPr id="4" name="Title 3">
+            <a:extLst>
+              <a:ext uri="{FF2B5EF4-FFF2-40B4-BE49-F238E27FC236}">
+                <a16:creationId xmlns:a16="http://schemas.microsoft.com/office/drawing/2014/main" id="{433A13B1-8BA1-C642-9161-244BF4A0D424}"/>
+              </a:ext>
+            </a:extLst>
+          </p:cNvPr>
+          <p:cNvSpPr>
+            <a:spLocks noGrp="1"/>
+          </p:cNvSpPr>
+          <p:nvPr>
+            <p:ph type="title"/>
+          </p:nvPr>
+        </p:nvSpPr>
+        <p:spPr/>
+        <p:txBody>
+          <a:bodyPr>
+            <a:normAutofit/>
+          </a:bodyPr>
+          <a:lstStyle/>
+          <a:p>
+            <a:r>
+              <a:rPr lang="en-US" dirty="0"/>
+              <a:t>What makes a good implementation?</a:t>
+            </a:r>
+          </a:p>
+        </p:txBody>
+      </p:sp>
+      <p:sp>
+        <p:nvSpPr>
+          <p:cNvPr id="5" name="Content Placeholder 4">
+            <a:extLst>
+              <a:ext uri="{FF2B5EF4-FFF2-40B4-BE49-F238E27FC236}">
+                <a16:creationId xmlns:a16="http://schemas.microsoft.com/office/drawing/2014/main" id="{18B28975-1768-A543-9D02-1BB9329C7767}"/>
+              </a:ext>
+            </a:extLst>
+          </p:cNvPr>
+          <p:cNvSpPr>
+            <a:spLocks noGrp="1"/>
+          </p:cNvSpPr>
+          <p:nvPr>
+            <p:ph idx="1"/>
+          </p:nvPr>
+        </p:nvSpPr>
+        <p:spPr>
+          <a:xfrm>
+            <a:off x="375152" y="1168924"/>
+            <a:ext cx="7703723" cy="3463799"/>
+          </a:xfrm>
+        </p:spPr>
+        <p:txBody>
+          <a:bodyPr/>
+          <a:lstStyle/>
+          <a:p>
+            <a:r>
+              <a:rPr lang="en-US" dirty="0"/>
+              <a:t>Quick implementation of key operations, with high confidence</a:t>
+            </a:r>
+          </a:p>
+          <a:p>
+            <a:pPr lvl="1"/>
+            <a:r>
+              <a:rPr lang="en-US" dirty="0"/>
+              <a:t>No matter what language, because we are probably not actually implementing the untyped lambda calculus</a:t>
+            </a:r>
+          </a:p>
+          <a:p>
+            <a:pPr lvl="1"/>
+            <a:r>
+              <a:rPr lang="en-US" dirty="0"/>
+              <a:t>i.e. could have multiple binders, patterns, </a:t>
+            </a:r>
+            <a:r>
+              <a:rPr lang="en-US" dirty="0" err="1"/>
+              <a:t>etc</a:t>
+            </a:r>
+            <a:endParaRPr lang="en-US" dirty="0"/>
+          </a:p>
+          <a:p>
+            <a:r>
+              <a:rPr lang="en-US" dirty="0"/>
+              <a:t>Minimal invariants to keep track of</a:t>
+            </a:r>
+          </a:p>
+          <a:p>
+            <a:pPr lvl="1"/>
+            <a:r>
+              <a:rPr lang="en-US" dirty="0"/>
+              <a:t>Or at least help with them</a:t>
+            </a:r>
+          </a:p>
+          <a:p>
+            <a:pPr lvl="1"/>
+            <a:r>
+              <a:rPr lang="en-US" dirty="0"/>
+              <a:t>example invariants:  BVC, shifting indices when changing scopes, </a:t>
+            </a:r>
+          </a:p>
+          <a:p>
+            <a:r>
+              <a:rPr lang="en-US" dirty="0"/>
+              <a:t>Reasonably fast runtime execution</a:t>
+            </a:r>
+          </a:p>
+          <a:p>
+            <a:pPr lvl="1"/>
+            <a:r>
+              <a:rPr lang="en-US" dirty="0"/>
+              <a:t>Very easy to end up with quadratic execution times</a:t>
+            </a:r>
+          </a:p>
+          <a:p>
+            <a:pPr lvl="1"/>
+            <a:r>
+              <a:rPr lang="en-US" dirty="0"/>
+              <a:t>Opportunity for early cut-off  (\</a:t>
+            </a:r>
+            <a:r>
+              <a:rPr lang="en-US" dirty="0" err="1"/>
+              <a:t>x.a</a:t>
+            </a:r>
+            <a:r>
+              <a:rPr lang="en-US" dirty="0"/>
+              <a:t>) {b/x}</a:t>
+            </a:r>
+          </a:p>
+          <a:p>
+            <a:pPr lvl="1"/>
+            <a:r>
+              <a:rPr lang="en-US" dirty="0"/>
+              <a:t>Constant factors dominate</a:t>
+            </a:r>
+          </a:p>
+          <a:p>
+            <a:pPr marL="342900" lvl="1" indent="0">
+              <a:buNone/>
+            </a:pPr>
+            <a:endParaRPr lang="en-US" dirty="0"/>
+          </a:p>
+        </p:txBody>
+      </p:sp>
+    </p:spTree>
+    <p:extLst>
+      <p:ext uri="{BB962C8B-B14F-4D97-AF65-F5344CB8AC3E}">
+        <p14:creationId xmlns:p14="http://schemas.microsoft.com/office/powerpoint/2010/main" val="1257689365"/>
+      </p:ext>
+    </p:extLst>
+  </p:cSld>
+  <p:clrMapOvr>
+    <a:masterClrMapping/>
+  </p:clrMapOvr>
+</p:sld>
+</file>
+
+<file path=ppt/slides/slide25.xml><?xml version="1.0" encoding="utf-8"?>
+<p:sld xmlns:a="http://schemas.openxmlformats.org/drawingml/2006/main" xmlns:r="http://schemas.openxmlformats.org/officeDocument/2006/relationships" xmlns:p="http://schemas.openxmlformats.org/presentationml/2006/main">
+  <p:cSld>
+    <p:spTree>
+      <p:nvGrpSpPr>
+        <p:cNvPr id="1" name=""/>
+        <p:cNvGrpSpPr/>
+        <p:nvPr/>
+      </p:nvGrpSpPr>
+      <p:grpSpPr>
+        <a:xfrm>
+          <a:off x="0" y="0"/>
+          <a:ext cx="0" cy="0"/>
+          <a:chOff x="0" y="0"/>
+          <a:chExt cx="0" cy="0"/>
+        </a:xfrm>
+      </p:grpSpPr>
+      <p:sp>
+        <p:nvSpPr>
           <p:cNvPr id="2" name="Title 1">
             <a:extLst>
               <a:ext uri="{FF2B5EF4-FFF2-40B4-BE49-F238E27FC236}">
@@ -12594,7 +12729,7 @@
 </p:sld>
 </file>
 
-<file path=ppt/slides/slide25.xml><?xml version="1.0" encoding="utf-8"?>
+<file path=ppt/slides/slide26.xml><?xml version="1.0" encoding="utf-8"?>
 <p:sld xmlns:a="http://schemas.openxmlformats.org/drawingml/2006/main" xmlns:r="http://schemas.openxmlformats.org/officeDocument/2006/relationships" xmlns:p="http://schemas.openxmlformats.org/presentationml/2006/main" show="0">
   <p:cSld>
     <p:spTree>
@@ -13373,7 +13508,7 @@
 </p:sld>
 </file>
 
-<file path=ppt/slides/slide26.xml><?xml version="1.0" encoding="utf-8"?>
+<file path=ppt/slides/slide27.xml><?xml version="1.0" encoding="utf-8"?>
 <p:sld xmlns:a="http://schemas.openxmlformats.org/drawingml/2006/main" xmlns:r="http://schemas.openxmlformats.org/officeDocument/2006/relationships" xmlns:p="http://schemas.openxmlformats.org/presentationml/2006/main" show="0">
   <p:cSld>
     <p:spTree>
@@ -14011,7 +14146,7 @@
 </p:sld>
 </file>
 
-<file path=ppt/slides/slide27.xml><?xml version="1.0" encoding="utf-8"?>
+<file path=ppt/slides/slide28.xml><?xml version="1.0" encoding="utf-8"?>
 <p:sld xmlns:a="http://schemas.openxmlformats.org/drawingml/2006/main" xmlns:r="http://schemas.openxmlformats.org/officeDocument/2006/relationships" xmlns:p="http://schemas.openxmlformats.org/presentationml/2006/main">
   <p:cSld>
     <p:spTree>
@@ -15501,7 +15636,7 @@
 </p:sld>
 </file>
 
-<file path=ppt/slides/slide28.xml><?xml version="1.0" encoding="utf-8"?>
+<file path=ppt/slides/slide29.xml><?xml version="1.0" encoding="utf-8"?>
 <p:sld xmlns:a="http://schemas.openxmlformats.org/drawingml/2006/main" xmlns:r="http://schemas.openxmlformats.org/officeDocument/2006/relationships" xmlns:p="http://schemas.openxmlformats.org/presentationml/2006/main">
   <p:cSld>
     <p:spTree>
@@ -16289,7 +16424,252 @@
 </p:sld>
 </file>
 
-<file path=ppt/slides/slide29.xml><?xml version="1.0" encoding="utf-8"?>
+<file path=ppt/slides/slide3.xml><?xml version="1.0" encoding="utf-8"?>
+<p:sld xmlns:a="http://schemas.openxmlformats.org/drawingml/2006/main" xmlns:r="http://schemas.openxmlformats.org/officeDocument/2006/relationships" xmlns:p="http://schemas.openxmlformats.org/presentationml/2006/main">
+  <p:cSld>
+    <p:spTree>
+      <p:nvGrpSpPr>
+        <p:cNvPr id="1" name=""/>
+        <p:cNvGrpSpPr/>
+        <p:nvPr/>
+      </p:nvGrpSpPr>
+      <p:grpSpPr>
+        <a:xfrm>
+          <a:off x="0" y="0"/>
+          <a:ext cx="0" cy="0"/>
+          <a:chOff x="0" y="0"/>
+          <a:chExt cx="0" cy="0"/>
+        </a:xfrm>
+      </p:grpSpPr>
+      <p:sp>
+        <p:nvSpPr>
+          <p:cNvPr id="4" name="Title 3">
+            <a:extLst>
+              <a:ext uri="{FF2B5EF4-FFF2-40B4-BE49-F238E27FC236}">
+                <a16:creationId xmlns:a16="http://schemas.microsoft.com/office/drawing/2014/main" id="{54AD2B03-A1DD-9048-886F-02DAC75169C7}"/>
+              </a:ext>
+            </a:extLst>
+          </p:cNvPr>
+          <p:cNvSpPr>
+            <a:spLocks noGrp="1"/>
+          </p:cNvSpPr>
+          <p:nvPr>
+            <p:ph type="title"/>
+          </p:nvPr>
+        </p:nvSpPr>
+        <p:spPr/>
+        <p:txBody>
+          <a:bodyPr>
+            <a:normAutofit/>
+          </a:bodyPr>
+          <a:lstStyle/>
+          <a:p>
+            <a:r>
+              <a:rPr lang="en-US" dirty="0"/>
+              <a:t>Key Operations on Lambda Calculus Terms</a:t>
+            </a:r>
+          </a:p>
+        </p:txBody>
+      </p:sp>
+      <p:sp>
+        <p:nvSpPr>
+          <p:cNvPr id="5" name="Content Placeholder 4">
+            <a:extLst>
+              <a:ext uri="{FF2B5EF4-FFF2-40B4-BE49-F238E27FC236}">
+                <a16:creationId xmlns:a16="http://schemas.microsoft.com/office/drawing/2014/main" id="{7BD33DFE-A792-7145-9E38-1B9D9ED8076A}"/>
+              </a:ext>
+            </a:extLst>
+          </p:cNvPr>
+          <p:cNvSpPr>
+            <a:spLocks noGrp="1"/>
+          </p:cNvSpPr>
+          <p:nvPr>
+            <p:ph sz="half" idx="1"/>
+          </p:nvPr>
+        </p:nvSpPr>
+        <p:spPr/>
+        <p:txBody>
+          <a:bodyPr/>
+          <a:lstStyle/>
+          <a:p>
+            <a:pPr marL="0" indent="0">
+              <a:buNone/>
+            </a:pPr>
+            <a:r>
+              <a:rPr lang="en-US" b="1" dirty="0"/>
+              <a:t>Alpha-equivalence     </a:t>
+            </a:r>
+          </a:p>
+          <a:p>
+            <a:pPr marL="0" indent="0">
+              <a:buNone/>
+            </a:pPr>
+            <a:r>
+              <a:rPr lang="en-US" b="1" dirty="0"/>
+              <a:t> </a:t>
+            </a:r>
+          </a:p>
+          <a:p>
+            <a:pPr marL="0" indent="0" algn="ctr">
+              <a:buNone/>
+            </a:pPr>
+            <a:r>
+              <a:rPr lang="en-US" dirty="0"/>
+              <a:t>a == b</a:t>
+            </a:r>
+            <a:endParaRPr lang="en-US" b="1" dirty="0"/>
+          </a:p>
+          <a:p>
+            <a:pPr marL="0" indent="0">
+              <a:buNone/>
+            </a:pPr>
+            <a:endParaRPr lang="en-US" dirty="0"/>
+          </a:p>
+          <a:p>
+            <a:pPr marL="0" indent="0">
+              <a:buNone/>
+            </a:pPr>
+            <a:r>
+              <a:rPr lang="en-US" dirty="0"/>
+              <a:t>Example</a:t>
+            </a:r>
+          </a:p>
+          <a:p>
+            <a:pPr marL="0" indent="0" algn="ctr">
+              <a:buNone/>
+            </a:pPr>
+            <a:r>
+              <a:rPr lang="en-US" dirty="0"/>
+              <a:t>\</a:t>
+            </a:r>
+            <a:r>
+              <a:rPr lang="en-US" dirty="0" err="1"/>
+              <a:t>x.x</a:t>
+            </a:r>
+            <a:r>
+              <a:rPr lang="en-US" dirty="0"/>
+              <a:t> == \</a:t>
+            </a:r>
+            <a:r>
+              <a:rPr lang="en-US" dirty="0" err="1"/>
+              <a:t>y.y</a:t>
+            </a:r>
+            <a:r>
+              <a:rPr lang="en-US" dirty="0"/>
+              <a:t>  =&gt; True</a:t>
+            </a:r>
+          </a:p>
+          <a:p>
+            <a:pPr marL="0" indent="0">
+              <a:buNone/>
+            </a:pPr>
+            <a:endParaRPr lang="en-US" dirty="0"/>
+          </a:p>
+        </p:txBody>
+      </p:sp>
+      <p:sp>
+        <p:nvSpPr>
+          <p:cNvPr id="6" name="Content Placeholder 5">
+            <a:extLst>
+              <a:ext uri="{FF2B5EF4-FFF2-40B4-BE49-F238E27FC236}">
+                <a16:creationId xmlns:a16="http://schemas.microsoft.com/office/drawing/2014/main" id="{FA4CC830-BBFE-ED40-867F-B6491F338E54}"/>
+              </a:ext>
+            </a:extLst>
+          </p:cNvPr>
+          <p:cNvSpPr>
+            <a:spLocks noGrp="1"/>
+          </p:cNvSpPr>
+          <p:nvPr>
+            <p:ph sz="half" idx="2"/>
+          </p:nvPr>
+        </p:nvSpPr>
+        <p:spPr>
+          <a:xfrm>
+            <a:off x="4629149" y="1369219"/>
+            <a:ext cx="4364125" cy="3263504"/>
+          </a:xfrm>
+        </p:spPr>
+        <p:txBody>
+          <a:bodyPr/>
+          <a:lstStyle/>
+          <a:p>
+            <a:pPr marL="0" indent="0">
+              <a:buNone/>
+            </a:pPr>
+            <a:r>
+              <a:rPr lang="en-US" b="1" dirty="0"/>
+              <a:t>Capture-avoiding substitution</a:t>
+            </a:r>
+          </a:p>
+          <a:p>
+            <a:pPr marL="0" indent="0">
+              <a:buNone/>
+            </a:pPr>
+            <a:endParaRPr lang="en-US" b="1" dirty="0"/>
+          </a:p>
+          <a:p>
+            <a:pPr marL="0" indent="0" algn="ctr">
+              <a:buNone/>
+            </a:pPr>
+            <a:r>
+              <a:rPr lang="en-US" dirty="0"/>
+              <a:t>a { b / x }</a:t>
+            </a:r>
+          </a:p>
+          <a:p>
+            <a:pPr marL="0" indent="0">
+              <a:buNone/>
+            </a:pPr>
+            <a:endParaRPr lang="en-US" dirty="0"/>
+          </a:p>
+          <a:p>
+            <a:pPr marL="0" indent="0">
+              <a:buNone/>
+            </a:pPr>
+            <a:r>
+              <a:rPr lang="en-US" dirty="0"/>
+              <a:t>Example</a:t>
+            </a:r>
+          </a:p>
+          <a:p>
+            <a:pPr marL="0" indent="0" algn="ctr">
+              <a:buNone/>
+            </a:pPr>
+            <a:r>
+              <a:rPr lang="en-US" dirty="0"/>
+              <a:t>(\</a:t>
+            </a:r>
+            <a:r>
+              <a:rPr lang="en-US" dirty="0" err="1"/>
+              <a:t>y.z</a:t>
+            </a:r>
+            <a:r>
+              <a:rPr lang="en-US" dirty="0"/>
+              <a:t>) { y / z }  =&gt; \w. y</a:t>
+            </a:r>
+          </a:p>
+          <a:p>
+            <a:pPr marL="0" indent="0">
+              <a:buNone/>
+            </a:pPr>
+            <a:endParaRPr lang="en-US" dirty="0"/>
+          </a:p>
+        </p:txBody>
+      </p:sp>
+    </p:spTree>
+    <p:extLst>
+      <p:ext uri="{BB962C8B-B14F-4D97-AF65-F5344CB8AC3E}">
+        <p14:creationId xmlns:p14="http://schemas.microsoft.com/office/powerpoint/2010/main" val="3893342088"/>
+      </p:ext>
+    </p:extLst>
+  </p:cSld>
+  <p:clrMapOvr>
+    <a:masterClrMapping/>
+  </p:clrMapOvr>
+</p:sld>
+</file>
+
+<file path=ppt/slides/slide30.xml><?xml version="1.0" encoding="utf-8"?>
 <p:sld xmlns:a="http://schemas.openxmlformats.org/drawingml/2006/main" xmlns:r="http://schemas.openxmlformats.org/officeDocument/2006/relationships" xmlns:p="http://schemas.openxmlformats.org/presentationml/2006/main">
   <p:cSld>
     <p:spTree>
@@ -16918,281 +17298,7 @@
 </p:sld>
 </file>
 
-<file path=ppt/slides/slide3.xml><?xml version="1.0" encoding="utf-8"?>
-<p:sld xmlns:a="http://schemas.openxmlformats.org/drawingml/2006/main" xmlns:r="http://schemas.openxmlformats.org/officeDocument/2006/relationships" xmlns:p="http://schemas.openxmlformats.org/presentationml/2006/main">
-  <p:cSld>
-    <p:spTree>
-      <p:nvGrpSpPr>
-        <p:cNvPr id="1" name=""/>
-        <p:cNvGrpSpPr/>
-        <p:nvPr/>
-      </p:nvGrpSpPr>
-      <p:grpSpPr>
-        <a:xfrm>
-          <a:off x="0" y="0"/>
-          <a:ext cx="0" cy="0"/>
-          <a:chOff x="0" y="0"/>
-          <a:chExt cx="0" cy="0"/>
-        </a:xfrm>
-      </p:grpSpPr>
-      <p:sp>
-        <p:nvSpPr>
-          <p:cNvPr id="4" name="Title 3">
-            <a:extLst>
-              <a:ext uri="{FF2B5EF4-FFF2-40B4-BE49-F238E27FC236}">
-                <a16:creationId xmlns:a16="http://schemas.microsoft.com/office/drawing/2014/main" id="{54AD2B03-A1DD-9048-886F-02DAC75169C7}"/>
-              </a:ext>
-            </a:extLst>
-          </p:cNvPr>
-          <p:cNvSpPr>
-            <a:spLocks noGrp="1"/>
-          </p:cNvSpPr>
-          <p:nvPr>
-            <p:ph type="title"/>
-          </p:nvPr>
-        </p:nvSpPr>
-        <p:spPr/>
-        <p:txBody>
-          <a:bodyPr>
-            <a:normAutofit/>
-          </a:bodyPr>
-          <a:lstStyle/>
-          <a:p>
-            <a:r>
-              <a:rPr lang="en-US" dirty="0"/>
-              <a:t>Key Operations on Lambda Calculus Terms</a:t>
-            </a:r>
-          </a:p>
-        </p:txBody>
-      </p:sp>
-      <p:sp>
-        <p:nvSpPr>
-          <p:cNvPr id="5" name="Content Placeholder 4">
-            <a:extLst>
-              <a:ext uri="{FF2B5EF4-FFF2-40B4-BE49-F238E27FC236}">
-                <a16:creationId xmlns:a16="http://schemas.microsoft.com/office/drawing/2014/main" id="{7BD33DFE-A792-7145-9E38-1B9D9ED8076A}"/>
-              </a:ext>
-            </a:extLst>
-          </p:cNvPr>
-          <p:cNvSpPr>
-            <a:spLocks noGrp="1"/>
-          </p:cNvSpPr>
-          <p:nvPr>
-            <p:ph sz="half" idx="1"/>
-          </p:nvPr>
-        </p:nvSpPr>
-        <p:spPr/>
-        <p:txBody>
-          <a:bodyPr/>
-          <a:lstStyle/>
-          <a:p>
-            <a:pPr marL="0" indent="0">
-              <a:buNone/>
-            </a:pPr>
-            <a:r>
-              <a:rPr lang="en-US" b="1" dirty="0"/>
-              <a:t>Alpha-equivalence     </a:t>
-            </a:r>
-          </a:p>
-          <a:p>
-            <a:pPr marL="0" indent="0">
-              <a:buNone/>
-            </a:pPr>
-            <a:r>
-              <a:rPr lang="en-US" b="1" dirty="0"/>
-              <a:t> </a:t>
-            </a:r>
-          </a:p>
-          <a:p>
-            <a:pPr marL="0" indent="0" algn="ctr">
-              <a:buNone/>
-            </a:pPr>
-            <a:r>
-              <a:rPr lang="en-US" dirty="0"/>
-              <a:t>a == b</a:t>
-            </a:r>
-            <a:endParaRPr lang="en-US" b="1" dirty="0"/>
-          </a:p>
-          <a:p>
-            <a:endParaRPr lang="en-US" dirty="0"/>
-          </a:p>
-          <a:p>
-            <a:pPr marL="0" indent="0" algn="ctr">
-              <a:buNone/>
-            </a:pPr>
-            <a:r>
-              <a:rPr lang="en-US" dirty="0"/>
-              <a:t>\</a:t>
-            </a:r>
-            <a:r>
-              <a:rPr lang="en-US" dirty="0" err="1"/>
-              <a:t>x.x</a:t>
-            </a:r>
-            <a:r>
-              <a:rPr lang="en-US" dirty="0"/>
-              <a:t> == \</a:t>
-            </a:r>
-            <a:r>
-              <a:rPr lang="en-US" dirty="0" err="1"/>
-              <a:t>y.y</a:t>
-            </a:r>
-            <a:r>
-              <a:rPr lang="en-US" dirty="0"/>
-              <a:t>  =&gt; True</a:t>
-            </a:r>
-          </a:p>
-          <a:p>
-            <a:pPr marL="0" indent="0">
-              <a:buNone/>
-            </a:pPr>
-            <a:endParaRPr lang="en-US" dirty="0"/>
-          </a:p>
-          <a:p>
-            <a:pPr marL="0" indent="0">
-              <a:buNone/>
-            </a:pPr>
-            <a:r>
-              <a:rPr lang="en-US" dirty="0" err="1"/>
-              <a:t>aeq</a:t>
-            </a:r>
-            <a:r>
-              <a:rPr lang="en-US" dirty="0"/>
-              <a:t> :: Exp -&gt; Exp -&gt; Bool</a:t>
-            </a:r>
-          </a:p>
-          <a:p>
-            <a:pPr marL="0" indent="0">
-              <a:buNone/>
-            </a:pPr>
-            <a:r>
-              <a:rPr lang="en-US" dirty="0" err="1"/>
-              <a:t>aeq</a:t>
-            </a:r>
-            <a:r>
-              <a:rPr lang="en-US" dirty="0"/>
-              <a:t> a b = …</a:t>
-            </a:r>
-          </a:p>
-        </p:txBody>
-      </p:sp>
-      <p:sp>
-        <p:nvSpPr>
-          <p:cNvPr id="6" name="Content Placeholder 5">
-            <a:extLst>
-              <a:ext uri="{FF2B5EF4-FFF2-40B4-BE49-F238E27FC236}">
-                <a16:creationId xmlns:a16="http://schemas.microsoft.com/office/drawing/2014/main" id="{FA4CC830-BBFE-ED40-867F-B6491F338E54}"/>
-              </a:ext>
-            </a:extLst>
-          </p:cNvPr>
-          <p:cNvSpPr>
-            <a:spLocks noGrp="1"/>
-          </p:cNvSpPr>
-          <p:nvPr>
-            <p:ph sz="half" idx="2"/>
-          </p:nvPr>
-        </p:nvSpPr>
-        <p:spPr>
-          <a:xfrm>
-            <a:off x="4629149" y="1369219"/>
-            <a:ext cx="4364125" cy="3263504"/>
-          </a:xfrm>
-        </p:spPr>
-        <p:txBody>
-          <a:bodyPr/>
-          <a:lstStyle/>
-          <a:p>
-            <a:pPr marL="0" indent="0">
-              <a:buNone/>
-            </a:pPr>
-            <a:r>
-              <a:rPr lang="en-US" b="1" dirty="0"/>
-              <a:t>Capture-avoiding substitution</a:t>
-            </a:r>
-          </a:p>
-          <a:p>
-            <a:pPr marL="0" indent="0">
-              <a:buNone/>
-            </a:pPr>
-            <a:endParaRPr lang="en-US" b="1" dirty="0"/>
-          </a:p>
-          <a:p>
-            <a:pPr marL="0" indent="0" algn="ctr">
-              <a:buNone/>
-            </a:pPr>
-            <a:r>
-              <a:rPr lang="en-US" dirty="0"/>
-              <a:t>a { b / x }</a:t>
-            </a:r>
-          </a:p>
-          <a:p>
-            <a:pPr marL="0" indent="0">
-              <a:buNone/>
-            </a:pPr>
-            <a:endParaRPr lang="en-US" dirty="0"/>
-          </a:p>
-          <a:p>
-            <a:pPr marL="0" indent="0" algn="ctr">
-              <a:buNone/>
-            </a:pPr>
-            <a:r>
-              <a:rPr lang="en-US" dirty="0"/>
-              <a:t>(\</a:t>
-            </a:r>
-            <a:r>
-              <a:rPr lang="en-US" dirty="0" err="1"/>
-              <a:t>y.z</a:t>
-            </a:r>
-            <a:r>
-              <a:rPr lang="en-US" dirty="0"/>
-              <a:t>) { y / z }  =&gt; \w. y</a:t>
-            </a:r>
-          </a:p>
-          <a:p>
-            <a:pPr marL="0" indent="0">
-              <a:buNone/>
-            </a:pPr>
-            <a:endParaRPr lang="en-US" dirty="0"/>
-          </a:p>
-          <a:p>
-            <a:pPr marL="0" indent="0">
-              <a:buNone/>
-            </a:pPr>
-            <a:r>
-              <a:rPr lang="en-US" dirty="0" err="1"/>
-              <a:t>subst</a:t>
-            </a:r>
-            <a:r>
-              <a:rPr lang="en-US" dirty="0"/>
-              <a:t> :: Var -&gt; Exp -&gt; Exp -&gt; Exp</a:t>
-            </a:r>
-            <a:br>
-              <a:rPr lang="en-US" dirty="0"/>
-            </a:br>
-            <a:r>
-              <a:rPr lang="en-US" dirty="0" err="1"/>
-              <a:t>subst</a:t>
-            </a:r>
-            <a:r>
-              <a:rPr lang="en-US" dirty="0"/>
-              <a:t> x a b = …</a:t>
-            </a:r>
-          </a:p>
-        </p:txBody>
-      </p:sp>
-    </p:spTree>
-    <p:extLst>
-      <p:ext uri="{BB962C8B-B14F-4D97-AF65-F5344CB8AC3E}">
-        <p14:creationId xmlns:p14="http://schemas.microsoft.com/office/powerpoint/2010/main" val="3893342088"/>
-      </p:ext>
-    </p:extLst>
-  </p:cSld>
-  <p:clrMapOvr>
-    <a:masterClrMapping/>
-  </p:clrMapOvr>
-</p:sld>
-</file>
-
-<file path=ppt/slides/slide30.xml><?xml version="1.0" encoding="utf-8"?>
+<file path=ppt/slides/slide31.xml><?xml version="1.0" encoding="utf-8"?>
 <p:sld xmlns:a="http://schemas.openxmlformats.org/drawingml/2006/main" xmlns:r="http://schemas.openxmlformats.org/officeDocument/2006/relationships" xmlns:p="http://schemas.openxmlformats.org/presentationml/2006/main">
   <p:cSld>
     <p:spTree>
@@ -18737,7 +18843,7 @@
 </p:sld>
 </file>
 
-<file path=ppt/slides/slide31.xml><?xml version="1.0" encoding="utf-8"?>
+<file path=ppt/slides/slide32.xml><?xml version="1.0" encoding="utf-8"?>
 <p:sld xmlns:a="http://schemas.openxmlformats.org/drawingml/2006/main" xmlns:r="http://schemas.openxmlformats.org/officeDocument/2006/relationships" xmlns:p="http://schemas.openxmlformats.org/presentationml/2006/main">
   <p:cSld>
     <p:spTree>
@@ -20161,7 +20267,7 @@
 </p:sld>
 </file>
 
-<file path=ppt/slides/slide32.xml><?xml version="1.0" encoding="utf-8"?>
+<file path=ppt/slides/slide33.xml><?xml version="1.0" encoding="utf-8"?>
 <p:sld xmlns:a="http://schemas.openxmlformats.org/drawingml/2006/main" xmlns:r="http://schemas.openxmlformats.org/officeDocument/2006/relationships" xmlns:p="http://schemas.openxmlformats.org/presentationml/2006/main">
   <p:cSld>
     <p:spTree>
@@ -21171,7 +21277,7 @@
 </p:sld>
 </file>
 
-<file path=ppt/slides/slide33.xml><?xml version="1.0" encoding="utf-8"?>
+<file path=ppt/slides/slide34.xml><?xml version="1.0" encoding="utf-8"?>
 <p:sld xmlns:a="http://schemas.openxmlformats.org/drawingml/2006/main" xmlns:r="http://schemas.openxmlformats.org/officeDocument/2006/relationships" xmlns:p="http://schemas.openxmlformats.org/presentationml/2006/main" show="0">
   <p:cSld>
     <p:spTree>
@@ -22607,7 +22713,7 @@
 </p:sld>
 </file>
 
-<file path=ppt/slides/slide34.xml><?xml version="1.0" encoding="utf-8"?>
+<file path=ppt/slides/slide35.xml><?xml version="1.0" encoding="utf-8"?>
 <p:sld xmlns:a="http://schemas.openxmlformats.org/drawingml/2006/main" xmlns:r="http://schemas.openxmlformats.org/officeDocument/2006/relationships" xmlns:p="http://schemas.openxmlformats.org/presentationml/2006/main">
   <p:cSld>
     <p:spTree>
@@ -24032,7 +24138,7 @@
 </p:sld>
 </file>
 
-<file path=ppt/slides/slide35.xml><?xml version="1.0" encoding="utf-8"?>
+<file path=ppt/slides/slide36.xml><?xml version="1.0" encoding="utf-8"?>
 <p:sld xmlns:a="http://schemas.openxmlformats.org/drawingml/2006/main" xmlns:r="http://schemas.openxmlformats.org/officeDocument/2006/relationships" xmlns:p="http://schemas.openxmlformats.org/presentationml/2006/main">
   <p:cSld>
     <p:spTree>
@@ -24320,7 +24426,7 @@
 </p:sld>
 </file>
 
-<file path=ppt/slides/slide36.xml><?xml version="1.0" encoding="utf-8"?>
+<file path=ppt/slides/slide37.xml><?xml version="1.0" encoding="utf-8"?>
 <p:sld xmlns:a="http://schemas.openxmlformats.org/drawingml/2006/main" xmlns:r="http://schemas.openxmlformats.org/officeDocument/2006/relationships" xmlns:p="http://schemas.openxmlformats.org/presentationml/2006/main">
   <p:cSld>
     <p:spTree>
@@ -24638,7 +24744,7 @@
 </p:sld>
 </file>
 
-<file path=ppt/slides/slide37.xml><?xml version="1.0" encoding="utf-8"?>
+<file path=ppt/slides/slide38.xml><?xml version="1.0" encoding="utf-8"?>
 <p:sld xmlns:a="http://schemas.openxmlformats.org/drawingml/2006/main" xmlns:r="http://schemas.openxmlformats.org/officeDocument/2006/relationships" xmlns:p="http://schemas.openxmlformats.org/presentationml/2006/main">
   <p:cSld>
     <p:spTree>
@@ -24719,286 +24825,6 @@
 </file>
 
 <file path=ppt/slides/slide4.xml><?xml version="1.0" encoding="utf-8"?>
-<p:sld xmlns:a="http://schemas.openxmlformats.org/drawingml/2006/main" xmlns:r="http://schemas.openxmlformats.org/officeDocument/2006/relationships" xmlns:p="http://schemas.openxmlformats.org/presentationml/2006/main">
-  <p:cSld>
-    <p:spTree>
-      <p:nvGrpSpPr>
-        <p:cNvPr id="1" name=""/>
-        <p:cNvGrpSpPr/>
-        <p:nvPr/>
-      </p:nvGrpSpPr>
-      <p:grpSpPr>
-        <a:xfrm>
-          <a:off x="0" y="0"/>
-          <a:ext cx="0" cy="0"/>
-          <a:chOff x="0" y="0"/>
-          <a:chExt cx="0" cy="0"/>
-        </a:xfrm>
-      </p:grpSpPr>
-      <p:sp>
-        <p:nvSpPr>
-          <p:cNvPr id="2" name="Title 1">
-            <a:extLst>
-              <a:ext uri="{FF2B5EF4-FFF2-40B4-BE49-F238E27FC236}">
-                <a16:creationId xmlns:a16="http://schemas.microsoft.com/office/drawing/2014/main" id="{94F32DAA-5F46-7C45-9BEB-5E380510A4B8}"/>
-              </a:ext>
-            </a:extLst>
-          </p:cNvPr>
-          <p:cNvSpPr>
-            <a:spLocks noGrp="1"/>
-          </p:cNvSpPr>
-          <p:nvPr>
-            <p:ph type="title"/>
-          </p:nvPr>
-        </p:nvSpPr>
-        <p:spPr/>
-        <p:txBody>
-          <a:bodyPr/>
-          <a:lstStyle/>
-          <a:p>
-            <a:r>
-              <a:rPr lang="en-US" dirty="0"/>
-              <a:t>General Form </a:t>
-            </a:r>
-          </a:p>
-        </p:txBody>
-      </p:sp>
-      <p:sp>
-        <p:nvSpPr>
-          <p:cNvPr id="3" name="Content Placeholder 2">
-            <a:extLst>
-              <a:ext uri="{FF2B5EF4-FFF2-40B4-BE49-F238E27FC236}">
-                <a16:creationId xmlns:a16="http://schemas.microsoft.com/office/drawing/2014/main" id="{70C3A6F2-93C8-8748-B392-904F7F2525F4}"/>
-              </a:ext>
-            </a:extLst>
-          </p:cNvPr>
-          <p:cNvSpPr>
-            <a:spLocks noGrp="1"/>
-          </p:cNvSpPr>
-          <p:nvPr>
-            <p:ph idx="1"/>
-          </p:nvPr>
-        </p:nvSpPr>
-        <p:spPr>
-          <a:xfrm>
-            <a:off x="375152" y="1168924"/>
-            <a:ext cx="8561457" cy="3273767"/>
-          </a:xfrm>
-        </p:spPr>
-        <p:txBody>
-          <a:bodyPr/>
-          <a:lstStyle/>
-          <a:p>
-            <a:pPr marL="0" indent="0">
-              <a:spcBef>
-                <a:spcPts val="300"/>
-              </a:spcBef>
-              <a:buNone/>
-            </a:pPr>
-            <a:r>
-              <a:rPr lang="en-US" dirty="0">
-                <a:solidFill>
-                  <a:srgbClr val="4B69C6"/>
-                </a:solidFill>
-                <a:latin typeface="Menlo" panose="020B0609030804020204" pitchFamily="49" charset="0"/>
-              </a:rPr>
-              <a:t>data</a:t>
-            </a:r>
-            <a:r>
-              <a:rPr lang="en-US" dirty="0">
-                <a:solidFill>
-                  <a:srgbClr val="333333"/>
-                </a:solidFill>
-                <a:latin typeface="Menlo" panose="020B0609030804020204" pitchFamily="49" charset="0"/>
-              </a:rPr>
-              <a:t> </a:t>
-            </a:r>
-            <a:r>
-              <a:rPr lang="en-US" dirty="0">
-                <a:solidFill>
-                  <a:srgbClr val="7A3E9D"/>
-                </a:solidFill>
-                <a:latin typeface="Menlo" panose="020B0609030804020204" pitchFamily="49" charset="0"/>
-              </a:rPr>
-              <a:t>Exp</a:t>
-            </a:r>
-            <a:r>
-              <a:rPr lang="en-US" dirty="0">
-                <a:solidFill>
-                  <a:srgbClr val="333333"/>
-                </a:solidFill>
-                <a:latin typeface="Menlo" panose="020B0609030804020204" pitchFamily="49" charset="0"/>
-              </a:rPr>
-              <a:t> = Var Var           </a:t>
-            </a:r>
-          </a:p>
-          <a:p>
-            <a:pPr marL="0" indent="0">
-              <a:spcBef>
-                <a:spcPts val="300"/>
-              </a:spcBef>
-              <a:buNone/>
-            </a:pPr>
-            <a:r>
-              <a:rPr lang="en-US" dirty="0">
-                <a:solidFill>
-                  <a:srgbClr val="333333"/>
-                </a:solidFill>
-                <a:latin typeface="Menlo" panose="020B0609030804020204" pitchFamily="49" charset="0"/>
-              </a:rPr>
-              <a:t>         | Lam (Bind Exp) </a:t>
-            </a:r>
-          </a:p>
-          <a:p>
-            <a:pPr marL="0" indent="0">
-              <a:spcBef>
-                <a:spcPts val="300"/>
-              </a:spcBef>
-              <a:buNone/>
-            </a:pPr>
-            <a:r>
-              <a:rPr lang="en-US" dirty="0">
-                <a:solidFill>
-                  <a:srgbClr val="333333"/>
-                </a:solidFill>
-                <a:latin typeface="Menlo" panose="020B0609030804020204" pitchFamily="49" charset="0"/>
-              </a:rPr>
-              <a:t>         | App Exp Exp</a:t>
-            </a:r>
-          </a:p>
-          <a:p>
-            <a:pPr marL="0" indent="0">
-              <a:spcBef>
-                <a:spcPts val="300"/>
-              </a:spcBef>
-              <a:buNone/>
-            </a:pPr>
-            <a:endParaRPr lang="en-US" dirty="0">
-              <a:solidFill>
-                <a:srgbClr val="333333"/>
-              </a:solidFill>
-              <a:latin typeface="Menlo" panose="020B0609030804020204" pitchFamily="49" charset="0"/>
-            </a:endParaRPr>
-          </a:p>
-          <a:p>
-            <a:pPr marL="0" indent="0">
-              <a:buNone/>
-            </a:pPr>
-            <a:r>
-              <a:rPr lang="en-US" dirty="0">
-                <a:solidFill>
-                  <a:srgbClr val="4B69C6"/>
-                </a:solidFill>
-                <a:latin typeface="Menlo" panose="020B0609030804020204" pitchFamily="49" charset="0"/>
-              </a:rPr>
-              <a:t>type</a:t>
-            </a:r>
-            <a:r>
-              <a:rPr lang="en-US" dirty="0">
-                <a:latin typeface="Menlo" panose="020B0609030804020204" pitchFamily="49" charset="0"/>
-                <a:ea typeface="Menlo" panose="020B0609030804020204" pitchFamily="49" charset="0"/>
-                <a:cs typeface="Menlo" panose="020B0609030804020204" pitchFamily="49" charset="0"/>
-              </a:rPr>
-              <a:t> Var  -- some way to represent variables</a:t>
-            </a:r>
-          </a:p>
-          <a:p>
-            <a:pPr marL="0" indent="0">
-              <a:buNone/>
-            </a:pPr>
-            <a:r>
-              <a:rPr lang="en-US" dirty="0">
-                <a:solidFill>
-                  <a:srgbClr val="4B69C6"/>
-                </a:solidFill>
-                <a:latin typeface="Menlo" panose="020B0609030804020204" pitchFamily="49" charset="0"/>
-              </a:rPr>
-              <a:t>type</a:t>
-            </a:r>
-            <a:r>
-              <a:rPr lang="en-US" dirty="0">
-                <a:latin typeface="Menlo" panose="020B0609030804020204" pitchFamily="49" charset="0"/>
-                <a:ea typeface="Menlo" panose="020B0609030804020204" pitchFamily="49" charset="0"/>
-                <a:cs typeface="Menlo" panose="020B0609030804020204" pitchFamily="49" charset="0"/>
-              </a:rPr>
-              <a:t> Bind t -- some way to represent binding/scope</a:t>
-            </a:r>
-          </a:p>
-          <a:p>
-            <a:pPr marL="0" indent="0">
-              <a:buNone/>
-            </a:pPr>
-            <a:endParaRPr lang="en-US" dirty="0">
-              <a:latin typeface="Menlo" panose="020B0609030804020204" pitchFamily="49" charset="0"/>
-              <a:ea typeface="Menlo" panose="020B0609030804020204" pitchFamily="49" charset="0"/>
-              <a:cs typeface="Menlo" panose="020B0609030804020204" pitchFamily="49" charset="0"/>
-            </a:endParaRPr>
-          </a:p>
-          <a:p>
-            <a:pPr marL="0" indent="0">
-              <a:buNone/>
-            </a:pPr>
-            <a:r>
-              <a:rPr lang="en-US" dirty="0" err="1">
-                <a:latin typeface="Menlo" panose="020B0609030804020204" pitchFamily="49" charset="0"/>
-                <a:ea typeface="Menlo" panose="020B0609030804020204" pitchFamily="49" charset="0"/>
-                <a:cs typeface="Menlo" panose="020B0609030804020204" pitchFamily="49" charset="0"/>
-              </a:rPr>
-              <a:t>aeq</a:t>
-            </a:r>
-            <a:r>
-              <a:rPr lang="en-US" dirty="0">
-                <a:latin typeface="Menlo" panose="020B0609030804020204" pitchFamily="49" charset="0"/>
-                <a:ea typeface="Menlo" panose="020B0609030804020204" pitchFamily="49" charset="0"/>
-                <a:cs typeface="Menlo" panose="020B0609030804020204" pitchFamily="49" charset="0"/>
-              </a:rPr>
-              <a:t> :: Exp -&gt; Exp -&gt; Bool</a:t>
-            </a:r>
-          </a:p>
-          <a:p>
-            <a:pPr marL="0" indent="0">
-              <a:buNone/>
-            </a:pPr>
-            <a:r>
-              <a:rPr lang="en-US" dirty="0" err="1">
-                <a:latin typeface="Menlo" panose="020B0609030804020204" pitchFamily="49" charset="0"/>
-                <a:ea typeface="Menlo" panose="020B0609030804020204" pitchFamily="49" charset="0"/>
-                <a:cs typeface="Menlo" panose="020B0609030804020204" pitchFamily="49" charset="0"/>
-              </a:rPr>
-              <a:t>subst</a:t>
-            </a:r>
-            <a:r>
-              <a:rPr lang="en-US" dirty="0">
-                <a:latin typeface="Menlo" panose="020B0609030804020204" pitchFamily="49" charset="0"/>
-                <a:ea typeface="Menlo" panose="020B0609030804020204" pitchFamily="49" charset="0"/>
-                <a:cs typeface="Menlo" panose="020B0609030804020204" pitchFamily="49" charset="0"/>
-              </a:rPr>
-              <a:t> :: Var -&gt; Exp -&gt; Exp -&gt; Exp</a:t>
-            </a:r>
-            <a:endParaRPr lang="en-US" dirty="0"/>
-          </a:p>
-          <a:p>
-            <a:pPr marL="0" indent="0">
-              <a:buNone/>
-            </a:pPr>
-            <a:endParaRPr lang="en-US" dirty="0"/>
-          </a:p>
-        </p:txBody>
-      </p:sp>
-    </p:spTree>
-    <p:extLst>
-      <p:ext uri="{BB962C8B-B14F-4D97-AF65-F5344CB8AC3E}">
-        <p14:creationId xmlns:p14="http://schemas.microsoft.com/office/powerpoint/2010/main" val="3828990099"/>
-      </p:ext>
-    </p:extLst>
-  </p:cSld>
-  <p:clrMapOvr>
-    <a:masterClrMapping/>
-  </p:clrMapOvr>
-</p:sld>
-</file>
-
-<file path=ppt/slides/slide5.xml><?xml version="1.0" encoding="utf-8"?>
 <p:sld xmlns:a="http://schemas.openxmlformats.org/drawingml/2006/main" xmlns:r="http://schemas.openxmlformats.org/officeDocument/2006/relationships" xmlns:p="http://schemas.openxmlformats.org/presentationml/2006/main">
   <p:cSld>
     <p:spTree>
@@ -25082,17 +24908,13 @@
           <a:p>
             <a:r>
               <a:rPr lang="en-US" sz="2000" dirty="0"/>
-              <a:t>Simple Names</a:t>
-            </a:r>
-          </a:p>
-          <a:p>
-            <a:r>
-              <a:rPr lang="en-US" sz="2000" dirty="0" err="1"/>
-              <a:t>Barandregt</a:t>
-            </a:r>
+              <a:t>Names: avoidance, BVC </a:t>
+            </a:r>
+          </a:p>
+          <a:p>
             <a:r>
               <a:rPr lang="en-US" sz="2000" dirty="0"/>
-              <a:t> Convention</a:t>
+              <a:t>Names: nominal approach</a:t>
             </a:r>
           </a:p>
           <a:p>
@@ -25212,7 +25034,7 @@
 </p:sld>
 </file>
 
-<file path=ppt/slides/slide6.xml><?xml version="1.0" encoding="utf-8"?>
+<file path=ppt/slides/slide5.xml><?xml version="1.0" encoding="utf-8"?>
 <p:sld xmlns:a="http://schemas.openxmlformats.org/drawingml/2006/main" xmlns:r="http://schemas.openxmlformats.org/officeDocument/2006/relationships" xmlns:p="http://schemas.openxmlformats.org/presentationml/2006/main">
   <p:cSld>
     <p:spTree>
@@ -25280,54 +25102,60 @@
           </a:xfrm>
         </p:spPr>
         <p:txBody>
-          <a:bodyPr/>
+          <a:bodyPr>
+            <a:normAutofit/>
+          </a:bodyPr>
           <a:lstStyle/>
           <a:p>
             <a:r>
-              <a:rPr lang="en-US" dirty="0"/>
+              <a:rPr lang="en-US" sz="2400" dirty="0"/>
               <a:t>Different goals: compiler vs. type checker vs. didactic explanation vs. proofs</a:t>
             </a:r>
           </a:p>
           <a:p>
             <a:pPr lvl="1"/>
             <a:r>
-              <a:rPr lang="en-US" dirty="0"/>
+              <a:rPr lang="en-US" sz="2000" dirty="0"/>
               <a:t>Subtle bugs are common, some designed to be "easier to use"</a:t>
             </a:r>
           </a:p>
           <a:p>
             <a:pPr lvl="1"/>
             <a:r>
-              <a:rPr lang="en-US" dirty="0"/>
+              <a:rPr lang="en-US" sz="2000" dirty="0"/>
               <a:t>Proofs are important, some designed to be "easier to reason about" </a:t>
             </a:r>
           </a:p>
           <a:p>
             <a:pPr lvl="1"/>
             <a:r>
-              <a:rPr lang="en-US" dirty="0"/>
+              <a:rPr lang="en-US" sz="2000" dirty="0"/>
               <a:t>Performance is important, some designed to be "faster"</a:t>
             </a:r>
           </a:p>
           <a:p>
+            <a:pPr lvl="1"/>
+            <a:endParaRPr lang="en-US" sz="2000" dirty="0"/>
+          </a:p>
+          <a:p>
             <a:pPr marL="0" indent="0">
               <a:buNone/>
             </a:pPr>
             <a:r>
-              <a:rPr lang="en-US" dirty="0"/>
+              <a:rPr lang="en-US" sz="2400" dirty="0"/>
               <a:t>But …</a:t>
             </a:r>
           </a:p>
           <a:p>
             <a:r>
-              <a:rPr lang="en-US" dirty="0"/>
-              <a:t>Testing is challenging: every language is different, so no common test suites</a:t>
-            </a:r>
-          </a:p>
-          <a:p>
-            <a:r>
-              <a:rPr lang="en-US" dirty="0"/>
-              <a:t>Benchmarking is challenging: every language is used for a different purpose, so no common benchmark suites</a:t>
+              <a:rPr lang="en-US" sz="2400" dirty="0"/>
+              <a:t>Which is the fastest?  (caveat: of the "pure" implementations)</a:t>
+            </a:r>
+          </a:p>
+          <a:p>
+            <a:r>
+              <a:rPr lang="en-US" sz="2400" dirty="0"/>
+              <a:t>pure means looks something like this…</a:t>
             </a:r>
           </a:p>
         </p:txBody>
@@ -25336,6 +25164,286 @@
     <p:extLst>
       <p:ext uri="{BB962C8B-B14F-4D97-AF65-F5344CB8AC3E}">
         <p14:creationId xmlns:p14="http://schemas.microsoft.com/office/powerpoint/2010/main" val="3526415357"/>
+      </p:ext>
+    </p:extLst>
+  </p:cSld>
+  <p:clrMapOvr>
+    <a:masterClrMapping/>
+  </p:clrMapOvr>
+</p:sld>
+</file>
+
+<file path=ppt/slides/slide6.xml><?xml version="1.0" encoding="utf-8"?>
+<p:sld xmlns:a="http://schemas.openxmlformats.org/drawingml/2006/main" xmlns:r="http://schemas.openxmlformats.org/officeDocument/2006/relationships" xmlns:p="http://schemas.openxmlformats.org/presentationml/2006/main">
+  <p:cSld>
+    <p:spTree>
+      <p:nvGrpSpPr>
+        <p:cNvPr id="1" name=""/>
+        <p:cNvGrpSpPr/>
+        <p:nvPr/>
+      </p:nvGrpSpPr>
+      <p:grpSpPr>
+        <a:xfrm>
+          <a:off x="0" y="0"/>
+          <a:ext cx="0" cy="0"/>
+          <a:chOff x="0" y="0"/>
+          <a:chExt cx="0" cy="0"/>
+        </a:xfrm>
+      </p:grpSpPr>
+      <p:sp>
+        <p:nvSpPr>
+          <p:cNvPr id="2" name="Title 1">
+            <a:extLst>
+              <a:ext uri="{FF2B5EF4-FFF2-40B4-BE49-F238E27FC236}">
+                <a16:creationId xmlns:a16="http://schemas.microsoft.com/office/drawing/2014/main" id="{94F32DAA-5F46-7C45-9BEB-5E380510A4B8}"/>
+              </a:ext>
+            </a:extLst>
+          </p:cNvPr>
+          <p:cNvSpPr>
+            <a:spLocks noGrp="1"/>
+          </p:cNvSpPr>
+          <p:nvPr>
+            <p:ph type="title"/>
+          </p:nvPr>
+        </p:nvSpPr>
+        <p:spPr/>
+        <p:txBody>
+          <a:bodyPr/>
+          <a:lstStyle/>
+          <a:p>
+            <a:r>
+              <a:rPr lang="en-US" dirty="0"/>
+              <a:t>General Form </a:t>
+            </a:r>
+          </a:p>
+        </p:txBody>
+      </p:sp>
+      <p:sp>
+        <p:nvSpPr>
+          <p:cNvPr id="3" name="Content Placeholder 2">
+            <a:extLst>
+              <a:ext uri="{FF2B5EF4-FFF2-40B4-BE49-F238E27FC236}">
+                <a16:creationId xmlns:a16="http://schemas.microsoft.com/office/drawing/2014/main" id="{70C3A6F2-93C8-8748-B392-904F7F2525F4}"/>
+              </a:ext>
+            </a:extLst>
+          </p:cNvPr>
+          <p:cNvSpPr>
+            <a:spLocks noGrp="1"/>
+          </p:cNvSpPr>
+          <p:nvPr>
+            <p:ph idx="1"/>
+          </p:nvPr>
+        </p:nvSpPr>
+        <p:spPr>
+          <a:xfrm>
+            <a:off x="375152" y="1168924"/>
+            <a:ext cx="8561457" cy="3273767"/>
+          </a:xfrm>
+        </p:spPr>
+        <p:txBody>
+          <a:bodyPr/>
+          <a:lstStyle/>
+          <a:p>
+            <a:pPr marL="0" indent="0">
+              <a:spcBef>
+                <a:spcPts val="300"/>
+              </a:spcBef>
+              <a:buNone/>
+            </a:pPr>
+            <a:r>
+              <a:rPr lang="en-US" dirty="0">
+                <a:solidFill>
+                  <a:srgbClr val="4B69C6"/>
+                </a:solidFill>
+                <a:latin typeface="Menlo" panose="020B0609030804020204" pitchFamily="49" charset="0"/>
+              </a:rPr>
+              <a:t>data</a:t>
+            </a:r>
+            <a:r>
+              <a:rPr lang="en-US" dirty="0">
+                <a:solidFill>
+                  <a:srgbClr val="333333"/>
+                </a:solidFill>
+                <a:latin typeface="Menlo" panose="020B0609030804020204" pitchFamily="49" charset="0"/>
+              </a:rPr>
+              <a:t> </a:t>
+            </a:r>
+            <a:r>
+              <a:rPr lang="en-US" dirty="0">
+                <a:solidFill>
+                  <a:srgbClr val="7A3E9D"/>
+                </a:solidFill>
+                <a:latin typeface="Menlo" panose="020B0609030804020204" pitchFamily="49" charset="0"/>
+              </a:rPr>
+              <a:t>Exp</a:t>
+            </a:r>
+            <a:r>
+              <a:rPr lang="en-US" dirty="0">
+                <a:solidFill>
+                  <a:srgbClr val="333333"/>
+                </a:solidFill>
+                <a:latin typeface="Menlo" panose="020B0609030804020204" pitchFamily="49" charset="0"/>
+              </a:rPr>
+              <a:t> = Var Var           </a:t>
+            </a:r>
+          </a:p>
+          <a:p>
+            <a:pPr marL="0" indent="0">
+              <a:spcBef>
+                <a:spcPts val="300"/>
+              </a:spcBef>
+              <a:buNone/>
+            </a:pPr>
+            <a:r>
+              <a:rPr lang="en-US" dirty="0">
+                <a:solidFill>
+                  <a:srgbClr val="333333"/>
+                </a:solidFill>
+                <a:latin typeface="Menlo" panose="020B0609030804020204" pitchFamily="49" charset="0"/>
+              </a:rPr>
+              <a:t>         | Lam (Bind Exp) </a:t>
+            </a:r>
+          </a:p>
+          <a:p>
+            <a:pPr marL="0" indent="0">
+              <a:spcBef>
+                <a:spcPts val="300"/>
+              </a:spcBef>
+              <a:buNone/>
+            </a:pPr>
+            <a:r>
+              <a:rPr lang="en-US" dirty="0">
+                <a:solidFill>
+                  <a:srgbClr val="333333"/>
+                </a:solidFill>
+                <a:latin typeface="Menlo" panose="020B0609030804020204" pitchFamily="49" charset="0"/>
+              </a:rPr>
+              <a:t>         | App Exp Exp</a:t>
+            </a:r>
+          </a:p>
+          <a:p>
+            <a:pPr marL="0" indent="0">
+              <a:spcBef>
+                <a:spcPts val="300"/>
+              </a:spcBef>
+              <a:buNone/>
+            </a:pPr>
+            <a:endParaRPr lang="en-US" dirty="0">
+              <a:solidFill>
+                <a:srgbClr val="333333"/>
+              </a:solidFill>
+              <a:latin typeface="Menlo" panose="020B0609030804020204" pitchFamily="49" charset="0"/>
+            </a:endParaRPr>
+          </a:p>
+          <a:p>
+            <a:pPr marL="0" indent="0">
+              <a:buNone/>
+            </a:pPr>
+            <a:r>
+              <a:rPr lang="en-US" dirty="0">
+                <a:solidFill>
+                  <a:srgbClr val="4B69C6"/>
+                </a:solidFill>
+                <a:latin typeface="Menlo" panose="020B0609030804020204" pitchFamily="49" charset="0"/>
+              </a:rPr>
+              <a:t>type</a:t>
+            </a:r>
+            <a:r>
+              <a:rPr lang="en-US" dirty="0">
+                <a:latin typeface="Menlo" panose="020B0609030804020204" pitchFamily="49" charset="0"/>
+                <a:ea typeface="Menlo" panose="020B0609030804020204" pitchFamily="49" charset="0"/>
+                <a:cs typeface="Menlo" panose="020B0609030804020204" pitchFamily="49" charset="0"/>
+              </a:rPr>
+              <a:t> Var  -- some way to represent variables</a:t>
+            </a:r>
+          </a:p>
+          <a:p>
+            <a:pPr marL="0" indent="0">
+              <a:buNone/>
+            </a:pPr>
+            <a:r>
+              <a:rPr lang="en-US" dirty="0">
+                <a:solidFill>
+                  <a:srgbClr val="4B69C6"/>
+                </a:solidFill>
+                <a:latin typeface="Menlo" panose="020B0609030804020204" pitchFamily="49" charset="0"/>
+              </a:rPr>
+              <a:t>type</a:t>
+            </a:r>
+            <a:r>
+              <a:rPr lang="en-US" dirty="0">
+                <a:latin typeface="Menlo" panose="020B0609030804020204" pitchFamily="49" charset="0"/>
+                <a:ea typeface="Menlo" panose="020B0609030804020204" pitchFamily="49" charset="0"/>
+                <a:cs typeface="Menlo" panose="020B0609030804020204" pitchFamily="49" charset="0"/>
+              </a:rPr>
+              <a:t> Bind t -- some way to represent binding/scope</a:t>
+            </a:r>
+          </a:p>
+          <a:p>
+            <a:pPr marL="0" indent="0">
+              <a:buNone/>
+            </a:pPr>
+            <a:endParaRPr lang="en-US" dirty="0">
+              <a:latin typeface="Menlo" panose="020B0609030804020204" pitchFamily="49" charset="0"/>
+              <a:ea typeface="Menlo" panose="020B0609030804020204" pitchFamily="49" charset="0"/>
+              <a:cs typeface="Menlo" panose="020B0609030804020204" pitchFamily="49" charset="0"/>
+            </a:endParaRPr>
+          </a:p>
+          <a:p>
+            <a:pPr marL="0" indent="0">
+              <a:buNone/>
+            </a:pPr>
+            <a:r>
+              <a:rPr lang="en-US" dirty="0" err="1">
+                <a:latin typeface="Menlo" panose="020B0609030804020204" pitchFamily="49" charset="0"/>
+                <a:ea typeface="Menlo" panose="020B0609030804020204" pitchFamily="49" charset="0"/>
+                <a:cs typeface="Menlo" panose="020B0609030804020204" pitchFamily="49" charset="0"/>
+              </a:rPr>
+              <a:t>aeq</a:t>
+            </a:r>
+            <a:r>
+              <a:rPr lang="en-US" dirty="0">
+                <a:latin typeface="Menlo" panose="020B0609030804020204" pitchFamily="49" charset="0"/>
+                <a:ea typeface="Menlo" panose="020B0609030804020204" pitchFamily="49" charset="0"/>
+                <a:cs typeface="Menlo" panose="020B0609030804020204" pitchFamily="49" charset="0"/>
+              </a:rPr>
+              <a:t> :: Exp -&gt; Exp -&gt; Bool</a:t>
+            </a:r>
+          </a:p>
+          <a:p>
+            <a:pPr marL="0" indent="0">
+              <a:buNone/>
+            </a:pPr>
+            <a:r>
+              <a:rPr lang="en-US" dirty="0" err="1">
+                <a:latin typeface="Menlo" panose="020B0609030804020204" pitchFamily="49" charset="0"/>
+                <a:ea typeface="Menlo" panose="020B0609030804020204" pitchFamily="49" charset="0"/>
+                <a:cs typeface="Menlo" panose="020B0609030804020204" pitchFamily="49" charset="0"/>
+              </a:rPr>
+              <a:t>subst</a:t>
+            </a:r>
+            <a:r>
+              <a:rPr lang="en-US" dirty="0">
+                <a:latin typeface="Menlo" panose="020B0609030804020204" pitchFamily="49" charset="0"/>
+                <a:ea typeface="Menlo" panose="020B0609030804020204" pitchFamily="49" charset="0"/>
+                <a:cs typeface="Menlo" panose="020B0609030804020204" pitchFamily="49" charset="0"/>
+              </a:rPr>
+              <a:t> :: Var -&gt; Exp -&gt; Exp -&gt; Exp</a:t>
+            </a:r>
+            <a:endParaRPr lang="en-US" dirty="0"/>
+          </a:p>
+          <a:p>
+            <a:pPr marL="0" indent="0">
+              <a:buNone/>
+            </a:pPr>
+            <a:endParaRPr lang="en-US" dirty="0"/>
+          </a:p>
+        </p:txBody>
+      </p:sp>
+    </p:spTree>
+    <p:extLst>
+      <p:ext uri="{BB962C8B-B14F-4D97-AF65-F5344CB8AC3E}">
+        <p14:creationId xmlns:p14="http://schemas.microsoft.com/office/powerpoint/2010/main" val="3828990099"/>
       </p:ext>
     </p:extLst>
   </p:cSld>
@@ -25418,12 +25526,6 @@
           <a:p>
             <a:r>
               <a:rPr lang="en-US" dirty="0"/>
-              <a:t>Focus on "pure" and "natural" implementations</a:t>
-            </a:r>
-          </a:p>
-          <a:p>
-            <a:r>
-              <a:rPr lang="en-US" dirty="0"/>
               <a:t>Gather implementations &amp; variations for comparison</a:t>
             </a:r>
           </a:p>
@@ -25458,7 +25560,14 @@
           <a:p>
             <a:r>
               <a:rPr lang="en-US" dirty="0"/>
-              <a:t>Extensive test suite </a:t>
+              <a:t>Test suite </a:t>
+            </a:r>
+          </a:p>
+          <a:p>
+            <a:pPr lvl="1"/>
+            <a:r>
+              <a:rPr lang="en-US" dirty="0"/>
+              <a:t>Testing is challenging: every language is different, so no common test suites</a:t>
             </a:r>
           </a:p>
           <a:p>
@@ -25472,6 +25581,13 @@
             <a:r>
               <a:rPr lang="en-US" dirty="0"/>
               <a:t>Benchmark suite &amp; harness</a:t>
+            </a:r>
+          </a:p>
+          <a:p>
+            <a:pPr lvl="1"/>
+            <a:r>
+              <a:rPr lang="en-US" dirty="0"/>
+              <a:t>Benchmarking is challenging: every language is used for a different purpose, so no common benchmark suites</a:t>
             </a:r>
           </a:p>
           <a:p>
@@ -25528,10 +25644,10 @@
       </p:grpSpPr>
       <p:sp>
         <p:nvSpPr>
-          <p:cNvPr id="4" name="Title 3">
+          <p:cNvPr id="2" name="Title 1">
             <a:extLst>
               <a:ext uri="{FF2B5EF4-FFF2-40B4-BE49-F238E27FC236}">
-                <a16:creationId xmlns:a16="http://schemas.microsoft.com/office/drawing/2014/main" id="{433A13B1-8BA1-C642-9161-244BF4A0D424}"/>
+                <a16:creationId xmlns:a16="http://schemas.microsoft.com/office/drawing/2014/main" id="{7D314583-AC43-0F4C-8287-12976AFF7637}"/>
               </a:ext>
             </a:extLst>
           </p:cNvPr>
@@ -25544,24 +25660,22 @@
         </p:nvSpPr>
         <p:spPr/>
         <p:txBody>
-          <a:bodyPr>
-            <a:normAutofit/>
-          </a:bodyPr>
+          <a:bodyPr/>
           <a:lstStyle/>
           <a:p>
             <a:r>
               <a:rPr lang="en-US" dirty="0"/>
-              <a:t>What makes a good implementation?</a:t>
+              <a:t>This talk</a:t>
             </a:r>
           </a:p>
         </p:txBody>
       </p:sp>
       <p:sp>
         <p:nvSpPr>
-          <p:cNvPr id="5" name="Content Placeholder 4">
+          <p:cNvPr id="3" name="Content Placeholder 2">
             <a:extLst>
               <a:ext uri="{FF2B5EF4-FFF2-40B4-BE49-F238E27FC236}">
-                <a16:creationId xmlns:a16="http://schemas.microsoft.com/office/drawing/2014/main" id="{18B28975-1768-A543-9D02-1BB9329C7767}"/>
+                <a16:creationId xmlns:a16="http://schemas.microsoft.com/office/drawing/2014/main" id="{2C7DADDB-77ED-E546-8F17-959DFE57D9D0}"/>
               </a:ext>
             </a:extLst>
           </p:cNvPr>
@@ -25572,107 +25686,40 @@
             <p:ph idx="1"/>
           </p:nvPr>
         </p:nvSpPr>
-        <p:spPr>
-          <a:xfrm>
-            <a:off x="375152" y="1168924"/>
-            <a:ext cx="7703723" cy="3463799"/>
-          </a:xfrm>
-        </p:spPr>
+        <p:spPr/>
         <p:txBody>
           <a:bodyPr/>
           <a:lstStyle/>
           <a:p>
             <a:r>
               <a:rPr lang="en-US" dirty="0"/>
-              <a:t>Quick implementation of key operations, with high confidence</a:t>
-            </a:r>
-          </a:p>
-          <a:p>
-            <a:pPr lvl="1"/>
+              <a:t>Overview of 3 most common approaches</a:t>
+            </a:r>
+          </a:p>
+          <a:p>
             <a:r>
               <a:rPr lang="en-US" dirty="0"/>
-              <a:t>No matter what our language really is, because it is probably not actually the untyped lambda calculus</a:t>
-            </a:r>
-          </a:p>
-          <a:p>
-            <a:pPr lvl="1"/>
+              <a:t>Discussion of benchmark results</a:t>
+            </a:r>
+          </a:p>
+          <a:p>
             <a:r>
               <a:rPr lang="en-US" dirty="0"/>
-              <a:t>i.e. could have multiple binders, patterns, </a:t>
-            </a:r>
-            <a:r>
-              <a:rPr lang="en-US" dirty="0" err="1"/>
-              <a:t>etc</a:t>
-            </a:r>
-            <a:endParaRPr lang="en-US" dirty="0"/>
+              <a:t>Spoiler alert --- variations overlap: </a:t>
+            </a:r>
           </a:p>
           <a:p>
             <a:r>
               <a:rPr lang="en-US" dirty="0"/>
-              <a:t>Minimal invariants to keep track of</a:t>
-            </a:r>
-          </a:p>
-          <a:p>
-            <a:pPr lvl="1"/>
-            <a:r>
-              <a:rPr lang="en-US" dirty="0"/>
-              <a:t>Or at least help with them</a:t>
-            </a:r>
-          </a:p>
-          <a:p>
-            <a:pPr lvl="1"/>
-            <a:r>
-              <a:rPr lang="en-US" dirty="0"/>
-              <a:t>example invariants:  BVC, shifting indices when changing scopes, </a:t>
-            </a:r>
-          </a:p>
-          <a:p>
-            <a:r>
-              <a:rPr lang="en-US" dirty="0"/>
-              <a:t>Reasonably fast runtime execution</a:t>
-            </a:r>
-          </a:p>
-          <a:p>
-            <a:pPr lvl="1"/>
-            <a:r>
-              <a:rPr lang="en-US" dirty="0"/>
-              <a:t>Very easy to end up with quadratic execution times</a:t>
-            </a:r>
-          </a:p>
-          <a:p>
-            <a:pPr lvl="1"/>
-            <a:r>
-              <a:rPr lang="en-US" dirty="0"/>
-              <a:t>Opportunity for early cut-off  (\</a:t>
-            </a:r>
-            <a:r>
-              <a:rPr lang="en-US" dirty="0" err="1"/>
-              <a:t>x.a</a:t>
-            </a:r>
-            <a:r>
-              <a:rPr lang="en-US" dirty="0"/>
-              <a:t>) {b/x}</a:t>
-            </a:r>
-          </a:p>
-          <a:p>
-            <a:pPr lvl="1"/>
-            <a:r>
-              <a:rPr lang="en-US" dirty="0"/>
-              <a:t>Constant factors dominate though</a:t>
-            </a:r>
-          </a:p>
-          <a:p>
-            <a:pPr marL="342900" lvl="1" indent="0">
-              <a:buNone/>
-            </a:pPr>
-            <a:endParaRPr lang="en-US" dirty="0"/>
+              <a:t>Common ways to optimize</a:t>
+            </a:r>
           </a:p>
         </p:txBody>
       </p:sp>
     </p:spTree>
     <p:extLst>
       <p:ext uri="{BB962C8B-B14F-4D97-AF65-F5344CB8AC3E}">
-        <p14:creationId xmlns:p14="http://schemas.microsoft.com/office/powerpoint/2010/main" val="1257689365"/>
+        <p14:creationId xmlns:p14="http://schemas.microsoft.com/office/powerpoint/2010/main" val="2148088719"/>
       </p:ext>
     </p:extLst>
   </p:cSld>
@@ -25780,7 +25827,7 @@
           <a:p>
             <a:r>
               <a:rPr lang="en-US" dirty="0"/>
-              <a:t>15 different de Bruijn implementations?</a:t>
+              <a:t>de Bruijn implementations</a:t>
             </a:r>
           </a:p>
         </p:txBody>
@@ -25944,7 +25991,25 @@
                 </a:solidFill>
                 <a:latin typeface="Menlo" panose="020B0609030804020204" pitchFamily="49" charset="0"/>
               </a:rPr>
-              <a:t> Var = Int      -- variables are indices</a:t>
+              <a:t> Var = </a:t>
+            </a:r>
+            <a:r>
+              <a:rPr lang="en-US" b="1" dirty="0">
+                <a:solidFill>
+                  <a:srgbClr val="333333"/>
+                </a:solidFill>
+                <a:latin typeface="Menlo" panose="020B0609030804020204" pitchFamily="49" charset="0"/>
+              </a:rPr>
+              <a:t>Int</a:t>
+            </a:r>
+            <a:r>
+              <a:rPr lang="en-US" dirty="0">
+                <a:solidFill>
+                  <a:srgbClr val="333333"/>
+                </a:solidFill>
+                <a:latin typeface="Menlo" panose="020B0609030804020204" pitchFamily="49" charset="0"/>
+              </a:rPr>
+              <a:t>      -- variables are indices</a:t>
             </a:r>
             <a:br>
               <a:rPr lang="en-US" dirty="0">
@@ -25970,7 +26035,25 @@
                 </a:solidFill>
                 <a:latin typeface="Menlo" panose="020B0609030804020204" pitchFamily="49" charset="0"/>
               </a:rPr>
-              <a:t>Bind t = t     -- no info at binders</a:t>
+              <a:t>Bind t = </a:t>
+            </a:r>
+            <a:r>
+              <a:rPr lang="en-US" b="1" dirty="0">
+                <a:solidFill>
+                  <a:srgbClr val="333333"/>
+                </a:solidFill>
+                <a:latin typeface="Menlo" panose="020B0609030804020204" pitchFamily="49" charset="0"/>
+              </a:rPr>
+              <a:t>t</a:t>
+            </a:r>
+            <a:r>
+              <a:rPr lang="en-US" dirty="0">
+                <a:solidFill>
+                  <a:srgbClr val="333333"/>
+                </a:solidFill>
+                <a:latin typeface="Menlo" panose="020B0609030804020204" pitchFamily="49" charset="0"/>
+              </a:rPr>
+              <a:t>     -- no info at binders</a:t>
             </a:r>
           </a:p>
           <a:p>

</xml_diff>